<commit_message>
updated agenda with database issues
</commit_message>
<xml_diff>
--- a/docs/Agenda 2nd week.pptx
+++ b/docs/Agenda 2nd week.pptx
@@ -7,9 +7,10 @@
   <p:sldIdLst>
     <p:sldId id="256" r:id="rId2"/>
     <p:sldId id="257" r:id="rId3"/>
-    <p:sldId id="259" r:id="rId4"/>
-    <p:sldId id="260" r:id="rId5"/>
-    <p:sldId id="258" r:id="rId6"/>
+    <p:sldId id="261" r:id="rId4"/>
+    <p:sldId id="259" r:id="rId5"/>
+    <p:sldId id="260" r:id="rId6"/>
+    <p:sldId id="258" r:id="rId7"/>
   </p:sldIdLst>
   <p:sldSz cx="9144000" cy="6858000" type="screen4x3"/>
   <p:notesSz cx="6858000" cy="9144000"/>
@@ -292,7 +293,7 @@
           <a:p>
             <a:fld id="{F88A511C-3F28-46A2-B008-AD0A70A8ECA6}" type="datetimeFigureOut">
               <a:rPr lang="it-IT" smtClean="0"/>
-              <a:t>23/11/2017</a:t>
+              <a:t>28/11/17</a:t>
             </a:fld>
             <a:endParaRPr lang="it-IT"/>
           </a:p>
@@ -462,7 +463,7 @@
           <a:p>
             <a:fld id="{F88A511C-3F28-46A2-B008-AD0A70A8ECA6}" type="datetimeFigureOut">
               <a:rPr lang="it-IT" smtClean="0"/>
-              <a:t>23/11/2017</a:t>
+              <a:t>28/11/17</a:t>
             </a:fld>
             <a:endParaRPr lang="it-IT"/>
           </a:p>
@@ -642,7 +643,7 @@
           <a:p>
             <a:fld id="{F88A511C-3F28-46A2-B008-AD0A70A8ECA6}" type="datetimeFigureOut">
               <a:rPr lang="it-IT" smtClean="0"/>
-              <a:t>23/11/2017</a:t>
+              <a:t>28/11/17</a:t>
             </a:fld>
             <a:endParaRPr lang="it-IT"/>
           </a:p>
@@ -812,7 +813,7 @@
           <a:p>
             <a:fld id="{F88A511C-3F28-46A2-B008-AD0A70A8ECA6}" type="datetimeFigureOut">
               <a:rPr lang="it-IT" smtClean="0"/>
-              <a:t>23/11/2017</a:t>
+              <a:t>28/11/17</a:t>
             </a:fld>
             <a:endParaRPr lang="it-IT"/>
           </a:p>
@@ -1058,7 +1059,7 @@
           <a:p>
             <a:fld id="{F88A511C-3F28-46A2-B008-AD0A70A8ECA6}" type="datetimeFigureOut">
               <a:rPr lang="it-IT" smtClean="0"/>
-              <a:t>23/11/2017</a:t>
+              <a:t>28/11/17</a:t>
             </a:fld>
             <a:endParaRPr lang="it-IT"/>
           </a:p>
@@ -1346,7 +1347,7 @@
           <a:p>
             <a:fld id="{F88A511C-3F28-46A2-B008-AD0A70A8ECA6}" type="datetimeFigureOut">
               <a:rPr lang="it-IT" smtClean="0"/>
-              <a:t>23/11/2017</a:t>
+              <a:t>28/11/17</a:t>
             </a:fld>
             <a:endParaRPr lang="it-IT"/>
           </a:p>
@@ -1768,7 +1769,7 @@
           <a:p>
             <a:fld id="{F88A511C-3F28-46A2-B008-AD0A70A8ECA6}" type="datetimeFigureOut">
               <a:rPr lang="it-IT" smtClean="0"/>
-              <a:t>23/11/2017</a:t>
+              <a:t>28/11/17</a:t>
             </a:fld>
             <a:endParaRPr lang="it-IT"/>
           </a:p>
@@ -1886,7 +1887,7 @@
           <a:p>
             <a:fld id="{F88A511C-3F28-46A2-B008-AD0A70A8ECA6}" type="datetimeFigureOut">
               <a:rPr lang="it-IT" smtClean="0"/>
-              <a:t>23/11/2017</a:t>
+              <a:t>28/11/17</a:t>
             </a:fld>
             <a:endParaRPr lang="it-IT"/>
           </a:p>
@@ -1981,7 +1982,7 @@
           <a:p>
             <a:fld id="{F88A511C-3F28-46A2-B008-AD0A70A8ECA6}" type="datetimeFigureOut">
               <a:rPr lang="it-IT" smtClean="0"/>
-              <a:t>23/11/2017</a:t>
+              <a:t>28/11/17</a:t>
             </a:fld>
             <a:endParaRPr lang="it-IT"/>
           </a:p>
@@ -2258,7 +2259,7 @@
           <a:p>
             <a:fld id="{F88A511C-3F28-46A2-B008-AD0A70A8ECA6}" type="datetimeFigureOut">
               <a:rPr lang="it-IT" smtClean="0"/>
-              <a:t>23/11/2017</a:t>
+              <a:t>28/11/17</a:t>
             </a:fld>
             <a:endParaRPr lang="it-IT"/>
           </a:p>
@@ -2511,7 +2512,7 @@
           <a:p>
             <a:fld id="{F88A511C-3F28-46A2-B008-AD0A70A8ECA6}" type="datetimeFigureOut">
               <a:rPr lang="it-IT" smtClean="0"/>
-              <a:t>23/11/2017</a:t>
+              <a:t>28/11/17</a:t>
             </a:fld>
             <a:endParaRPr lang="it-IT"/>
           </a:p>
@@ -2724,7 +2725,7 @@
           <a:p>
             <a:fld id="{F88A511C-3F28-46A2-B008-AD0A70A8ECA6}" type="datetimeFigureOut">
               <a:rPr lang="it-IT" smtClean="0"/>
-              <a:t>23/11/2017</a:t>
+              <a:t>28/11/17</a:t>
             </a:fld>
             <a:endParaRPr lang="it-IT"/>
           </a:p>
@@ -3298,11 +3299,7 @@
           <a:p>
             <a:r>
               <a:rPr lang="de-CH" dirty="0" smtClean="0"/>
-              <a:t>To explain contents in </a:t>
-            </a:r>
-            <a:r>
-              <a:rPr lang="de-CH" dirty="0" smtClean="0"/>
-              <a:t>Electronic Order Book.pptx I’m available every day from 14:30 in SI-003 and whatever other time slot upon request. </a:t>
+              <a:t>To explain contents in Electronic Order Book.pptx I’m available every day from 14:30 in SI-003 and whatever other time slot upon request. </a:t>
             </a:r>
             <a:endParaRPr lang="it-IT" dirty="0"/>
           </a:p>
@@ -3354,17 +3351,174 @@
           <a:lstStyle/>
           <a:p>
             <a:r>
-              <a:rPr lang="de-CH" dirty="0" smtClean="0"/>
-              <a:t>GUI: problems</a:t>
-            </a:r>
-            <a:endParaRPr lang="it-IT" dirty="0"/>
+              <a:rPr lang="en-US" dirty="0" smtClean="0"/>
+              <a:t>Database</a:t>
+            </a:r>
+            <a:endParaRPr lang="en-US" dirty="0"/>
+          </a:p>
+        </p:txBody>
+      </p:sp>
+      <p:sp>
+        <p:nvSpPr>
+          <p:cNvPr id="3" name="TextBox 2"/>
+          <p:cNvSpPr txBox="1"/>
+          <p:nvPr/>
+        </p:nvSpPr>
+        <p:spPr>
+          <a:xfrm>
+            <a:off x="609600" y="1828800"/>
+            <a:ext cx="7848600" cy="4524316"/>
+          </a:xfrm>
+          <a:prstGeom prst="rect">
+            <a:avLst/>
+          </a:prstGeom>
+          <a:noFill/>
+        </p:spPr>
+        <p:txBody>
+          <a:bodyPr wrap="square" rtlCol="0">
+            <a:spAutoFit/>
+          </a:bodyPr>
+          <a:lstStyle/>
+          <a:p>
+            <a:pPr algn="just"/>
+            <a:r>
+              <a:rPr lang="en-US" dirty="0" smtClean="0"/>
+              <a:t>The registry should have nested schemas different according to asset classes. </a:t>
+            </a:r>
+            <a:r>
+              <a:rPr lang="en-US" dirty="0"/>
+              <a:t>In particular the "class" field should '</a:t>
+            </a:r>
+            <a:r>
+              <a:rPr lang="en-US" dirty="0" err="1" smtClean="0"/>
+              <a:t>polymorphically</a:t>
+            </a:r>
+            <a:r>
+              <a:rPr lang="en-US" dirty="0"/>
+              <a:t>' be populated </a:t>
+            </a:r>
+            <a:r>
+              <a:rPr lang="en-US" dirty="0" smtClean="0"/>
+              <a:t>by </a:t>
+            </a:r>
+            <a:r>
+              <a:rPr lang="en-US" dirty="0"/>
+              <a:t>different asset classes schemas each one with its own </a:t>
+            </a:r>
+            <a:r>
+              <a:rPr lang="en-US" dirty="0" smtClean="0"/>
+              <a:t>contents (</a:t>
+            </a:r>
+            <a:r>
+              <a:rPr lang="en-US" dirty="0"/>
+              <a:t>e.g. futures asset class has an "</a:t>
+            </a:r>
+            <a:r>
+              <a:rPr lang="en-US" dirty="0" err="1"/>
+              <a:t>expiring_date</a:t>
+            </a:r>
+            <a:r>
+              <a:rPr lang="en-US" dirty="0"/>
+              <a:t>" field, equities not</a:t>
+            </a:r>
+            <a:r>
+              <a:rPr lang="en-US" dirty="0" smtClean="0"/>
+              <a:t>) while there is a set of fields shared by all asset classes. Three solutions are possible:</a:t>
+            </a:r>
+          </a:p>
+          <a:p>
+            <a:pPr algn="just"/>
+            <a:endParaRPr lang="en-US" dirty="0"/>
+          </a:p>
+          <a:p>
+            <a:pPr marL="342900" indent="-342900" algn="just">
+              <a:buFont typeface="+mj-lt"/>
+              <a:buAutoNum type="arabicPeriod"/>
+            </a:pPr>
+            <a:r>
+              <a:rPr lang="en-US" dirty="0" smtClean="0"/>
+              <a:t>Mixed;</a:t>
+            </a:r>
+          </a:p>
+          <a:p>
+            <a:pPr marL="342900" indent="-342900" algn="just">
+              <a:buFont typeface="+mj-lt"/>
+              <a:buAutoNum type="arabicPeriod"/>
+            </a:pPr>
+            <a:r>
+              <a:rPr lang="en-US" dirty="0" smtClean="0"/>
+              <a:t>Population;</a:t>
+            </a:r>
+          </a:p>
+          <a:p>
+            <a:pPr marL="342900" indent="-342900" algn="just">
+              <a:buFont typeface="+mj-lt"/>
+              <a:buAutoNum type="arabicPeriod"/>
+            </a:pPr>
+            <a:r>
+              <a:rPr lang="en-US" dirty="0" smtClean="0"/>
+              <a:t>Discriminator;</a:t>
+            </a:r>
+          </a:p>
+          <a:p>
+            <a:pPr marL="342900" indent="-342900" algn="just">
+              <a:buFont typeface="+mj-lt"/>
+              <a:buAutoNum type="arabicPeriod"/>
+            </a:pPr>
+            <a:endParaRPr lang="en-US" dirty="0"/>
+          </a:p>
+          <a:p>
+            <a:pPr algn="just"/>
+            <a:r>
+              <a:rPr lang="en-US" dirty="0" smtClean="0"/>
+              <a:t>I have implemented an example of all that solution. The third seems the better. Other problems to fix refers to validation and in particular:</a:t>
+            </a:r>
+          </a:p>
+          <a:p>
+            <a:pPr algn="just"/>
+            <a:endParaRPr lang="en-US" dirty="0"/>
+          </a:p>
+          <a:p>
+            <a:pPr marL="285750" indent="-285750" algn="just">
+              <a:buFont typeface="Arial"/>
+              <a:buChar char="•"/>
+            </a:pPr>
+            <a:r>
+              <a:rPr lang="en-US" dirty="0" smtClean="0"/>
+              <a:t>How to validate two mutually exclusive fields in the portfolio settings;</a:t>
+            </a:r>
+          </a:p>
+          <a:p>
+            <a:pPr marL="285750" indent="-285750" algn="just">
+              <a:buFont typeface="Arial"/>
+              <a:buChar char="•"/>
+            </a:pPr>
+            <a:r>
+              <a:rPr lang="en-US" dirty="0" smtClean="0"/>
+              <a:t>How to check if the </a:t>
+            </a:r>
+            <a:r>
+              <a:rPr lang="en-US" dirty="0" err="1" smtClean="0"/>
+              <a:t>AssetClassSchema</a:t>
+            </a:r>
+            <a:r>
+              <a:rPr lang="en-US" dirty="0" smtClean="0"/>
+              <a:t> is correctly populated;</a:t>
+            </a:r>
+          </a:p>
+          <a:p>
+            <a:pPr marL="285750" indent="-285750" algn="just">
+              <a:buFont typeface="Arial"/>
+              <a:buChar char="•"/>
+            </a:pPr>
+            <a:endParaRPr lang="en-US" dirty="0"/>
           </a:p>
         </p:txBody>
       </p:sp>
     </p:spTree>
     <p:extLst>
       <p:ext uri="{BB962C8B-B14F-4D97-AF65-F5344CB8AC3E}">
-        <p14:creationId xmlns:p14="http://schemas.microsoft.com/office/powerpoint/2010/main" val="3823785302"/>
+        <p14:creationId xmlns:p14="http://schemas.microsoft.com/office/powerpoint/2010/main" val="1556093920"/>
       </p:ext>
     </p:extLst>
   </p:cSld>
@@ -3408,6 +3562,59 @@
           <a:p>
             <a:r>
               <a:rPr lang="de-CH" dirty="0" smtClean="0"/>
+              <a:t>GUI: problems</a:t>
+            </a:r>
+            <a:endParaRPr lang="it-IT" dirty="0"/>
+          </a:p>
+        </p:txBody>
+      </p:sp>
+    </p:spTree>
+    <p:extLst>
+      <p:ext uri="{BB962C8B-B14F-4D97-AF65-F5344CB8AC3E}">
+        <p14:creationId xmlns:p14="http://schemas.microsoft.com/office/powerpoint/2010/main" val="3823785302"/>
+      </p:ext>
+    </p:extLst>
+  </p:cSld>
+  <p:clrMapOvr>
+    <a:masterClrMapping/>
+  </p:clrMapOvr>
+</p:sld>
+</file>
+
+<file path=ppt/slides/slide5.xml><?xml version="1.0" encoding="utf-8"?>
+<p:sld xmlns:a="http://schemas.openxmlformats.org/drawingml/2006/main" xmlns:r="http://schemas.openxmlformats.org/officeDocument/2006/relationships" xmlns:p="http://schemas.openxmlformats.org/presentationml/2006/main">
+  <p:cSld>
+    <p:spTree>
+      <p:nvGrpSpPr>
+        <p:cNvPr id="1" name=""/>
+        <p:cNvGrpSpPr/>
+        <p:nvPr/>
+      </p:nvGrpSpPr>
+      <p:grpSpPr>
+        <a:xfrm>
+          <a:off x="0" y="0"/>
+          <a:ext cx="0" cy="0"/>
+          <a:chOff x="0" y="0"/>
+          <a:chExt cx="0" cy="0"/>
+        </a:xfrm>
+      </p:grpSpPr>
+      <p:sp>
+        <p:nvSpPr>
+          <p:cNvPr id="2" name="Title 1"/>
+          <p:cNvSpPr>
+            <a:spLocks noGrp="1"/>
+          </p:cNvSpPr>
+          <p:nvPr>
+            <p:ph type="title"/>
+          </p:nvPr>
+        </p:nvSpPr>
+        <p:spPr/>
+        <p:txBody>
+          <a:bodyPr/>
+          <a:lstStyle/>
+          <a:p>
+            <a:r>
+              <a:rPr lang="de-CH" dirty="0" smtClean="0"/>
               <a:t>Routes: problems</a:t>
             </a:r>
             <a:endParaRPr lang="it-IT" dirty="0"/>
@@ -3427,7 +3634,7 @@
 </p:sld>
 </file>
 
-<file path=ppt/slides/slide5.xml><?xml version="1.0" encoding="utf-8"?>
+<file path=ppt/slides/slide6.xml><?xml version="1.0" encoding="utf-8"?>
 <p:sld xmlns:a="http://schemas.openxmlformats.org/drawingml/2006/main" xmlns:r="http://schemas.openxmlformats.org/officeDocument/2006/relationships" xmlns:p="http://schemas.openxmlformats.org/presentationml/2006/main">
   <p:cSld>
     <p:spTree>

</xml_diff>